<commit_message>
Lecture 8 readings and slides.
</commit_message>
<xml_diff>
--- a/lectures/07-parallel-program-performance.pptx
+++ b/lectures/07-parallel-program-performance.pptx
@@ -5,29 +5,30 @@
     <p:sldMasterId id="2147483648" r:id="rId4"/>
   </p:sldMasterIdLst>
   <p:notesMasterIdLst>
-    <p:notesMasterId r:id="rId25"/>
+    <p:notesMasterId r:id="rId26"/>
   </p:notesMasterIdLst>
   <p:sldIdLst>
     <p:sldId id="256" r:id="rId5"/>
-    <p:sldId id="260" r:id="rId6"/>
-    <p:sldId id="265" r:id="rId7"/>
-    <p:sldId id="263" r:id="rId8"/>
-    <p:sldId id="266" r:id="rId9"/>
-    <p:sldId id="267" r:id="rId10"/>
-    <p:sldId id="261" r:id="rId11"/>
-    <p:sldId id="268" r:id="rId12"/>
-    <p:sldId id="262" r:id="rId13"/>
-    <p:sldId id="264" r:id="rId14"/>
-    <p:sldId id="269" r:id="rId15"/>
-    <p:sldId id="270" r:id="rId16"/>
-    <p:sldId id="271" r:id="rId17"/>
-    <p:sldId id="277" r:id="rId18"/>
-    <p:sldId id="272" r:id="rId19"/>
-    <p:sldId id="273" r:id="rId20"/>
-    <p:sldId id="276" r:id="rId21"/>
-    <p:sldId id="274" r:id="rId22"/>
-    <p:sldId id="275" r:id="rId23"/>
-    <p:sldId id="279" r:id="rId24"/>
+    <p:sldId id="280" r:id="rId6"/>
+    <p:sldId id="260" r:id="rId7"/>
+    <p:sldId id="265" r:id="rId8"/>
+    <p:sldId id="263" r:id="rId9"/>
+    <p:sldId id="266" r:id="rId10"/>
+    <p:sldId id="267" r:id="rId11"/>
+    <p:sldId id="261" r:id="rId12"/>
+    <p:sldId id="268" r:id="rId13"/>
+    <p:sldId id="262" r:id="rId14"/>
+    <p:sldId id="264" r:id="rId15"/>
+    <p:sldId id="269" r:id="rId16"/>
+    <p:sldId id="270" r:id="rId17"/>
+    <p:sldId id="271" r:id="rId18"/>
+    <p:sldId id="277" r:id="rId19"/>
+    <p:sldId id="272" r:id="rId20"/>
+    <p:sldId id="273" r:id="rId21"/>
+    <p:sldId id="276" r:id="rId22"/>
+    <p:sldId id="274" r:id="rId23"/>
+    <p:sldId id="275" r:id="rId24"/>
+    <p:sldId id="279" r:id="rId25"/>
   </p:sldIdLst>
   <p:sldSz cx="9144000" cy="6858000" type="screen4x3"/>
   <p:notesSz cx="6858000" cy="9144000"/>
@@ -604,7 +605,7 @@
           <a:p>
             <a:fld id="{BD1F574B-F1F9-4A58-A9A6-B35C496CFC51}" type="slidenum">
               <a:rPr lang="en-US" smtClean="0"/>
-              <a:t>3</a:t>
+              <a:t>4</a:t>
             </a:fld>
             <a:endParaRPr lang="en-US"/>
           </a:p>
@@ -688,7 +689,7 @@
           <a:p>
             <a:fld id="{BD1F574B-F1F9-4A58-A9A6-B35C496CFC51}" type="slidenum">
               <a:rPr lang="en-US" smtClean="0"/>
-              <a:t>9</a:t>
+              <a:t>10</a:t>
             </a:fld>
             <a:endParaRPr lang="en-US"/>
           </a:p>
@@ -3363,13 +3364,8 @@
           <a:p>
             <a:r>
               <a:rPr lang="en-US" sz="2000" dirty="0" smtClean="0"/>
-              <a:t>Fall </a:t>
-            </a:r>
-            <a:r>
-              <a:rPr lang="en-US" sz="2000" dirty="0" smtClean="0"/>
-              <a:t>2016</a:t>
-            </a:r>
-            <a:endParaRPr lang="en-US" sz="2000" dirty="0" smtClean="0"/>
+              <a:t>Fall 2016</a:t>
+            </a:r>
           </a:p>
           <a:p>
             <a:r>
@@ -3437,7 +3433,7 @@
           <a:p>
             <a:r>
               <a:rPr lang="en-US" dirty="0" smtClean="0"/>
-              <a:t>Step 3 - Metrics</a:t>
+              <a:t>Scalability</a:t>
             </a:r>
             <a:endParaRPr lang="en-US" dirty="0"/>
           </a:p>
@@ -3456,98 +3452,119 @@
         <p:spPr/>
         <p:txBody>
           <a:bodyPr>
-            <a:normAutofit fontScale="92500" lnSpcReduction="10000"/>
+            <a:normAutofit fontScale="85000" lnSpcReduction="10000"/>
           </a:bodyPr>
           <a:lstStyle/>
           <a:p>
             <a:r>
               <a:rPr lang="en-US" dirty="0" smtClean="0"/>
-              <a:t>Application:</a:t>
+              <a:t>User-oriented properties:</a:t>
             </a:r>
           </a:p>
           <a:p>
             <a:pPr lvl="1"/>
             <a:r>
               <a:rPr lang="en-US" dirty="0" smtClean="0"/>
-              <a:t>Concurrency</a:t>
+              <a:t>Domain specific</a:t>
+            </a:r>
+          </a:p>
+          <a:p>
+            <a:pPr lvl="2"/>
+            <a:r>
+              <a:rPr lang="en-US" dirty="0" smtClean="0"/>
+              <a:t>Example: number of rows in table</a:t>
+            </a:r>
+            <a:endParaRPr lang="en-US" dirty="0"/>
+          </a:p>
+          <a:p>
+            <a:r>
+              <a:rPr lang="en-US" dirty="0" smtClean="0"/>
+              <a:t>Resource-oriented properties</a:t>
             </a:r>
           </a:p>
           <a:p>
             <a:pPr lvl="1"/>
             <a:r>
               <a:rPr lang="en-US" dirty="0" smtClean="0"/>
-              <a:t>Communication-to-computation ratio</a:t>
+              <a:t>Problem-constrained scaling</a:t>
+            </a:r>
+          </a:p>
+          <a:p>
+            <a:pPr lvl="2"/>
+            <a:r>
+              <a:rPr lang="en-US" dirty="0" smtClean="0"/>
+              <a:t>Problem size is fixed</a:t>
+            </a:r>
+          </a:p>
+          <a:p>
+            <a:pPr lvl="2"/>
+            <a:r>
+              <a:rPr lang="en-US" dirty="0" smtClean="0"/>
+              <a:t>Speedup = Time(1) / Time(N)</a:t>
             </a:r>
           </a:p>
           <a:p>
             <a:pPr lvl="1"/>
             <a:r>
               <a:rPr lang="en-US" dirty="0" smtClean="0"/>
-              <a:t>Synchronization and I/O frequency</a:t>
+              <a:t>Time-constrained scaling</a:t>
+            </a:r>
+          </a:p>
+          <a:p>
+            <a:pPr lvl="2"/>
+            <a:r>
+              <a:rPr lang="en-US" dirty="0" smtClean="0"/>
+              <a:t>Wall-clock time is fixed</a:t>
+            </a:r>
+          </a:p>
+          <a:p>
+            <a:pPr lvl="2"/>
+            <a:r>
+              <a:rPr lang="en-US" dirty="0" smtClean="0"/>
+              <a:t>Speedup = Work(N) / Work(1)</a:t>
+            </a:r>
+          </a:p>
+          <a:p>
+            <a:pPr lvl="2"/>
+            <a:r>
+              <a:rPr lang="en-US" dirty="0" smtClean="0"/>
+              <a:t>How to measure work?</a:t>
             </a:r>
           </a:p>
           <a:p>
             <a:pPr lvl="1"/>
             <a:r>
               <a:rPr lang="en-US" dirty="0" smtClean="0"/>
-              <a:t>Temporal and spatial locality</a:t>
+              <a:t>Memory-constrained scaling</a:t>
+            </a:r>
+          </a:p>
+          <a:p>
+            <a:pPr lvl="2"/>
+            <a:r>
+              <a:rPr lang="en-US" dirty="0" smtClean="0"/>
+              <a:t>Memory usage per thread is fixed</a:t>
+            </a:r>
+          </a:p>
+          <a:p>
+            <a:pPr lvl="2"/>
+            <a:r>
+              <a:rPr lang="en-US" dirty="0" smtClean="0"/>
+              <a:t>Speedup = (Work(N) / Time(N)) x (Time(1) / Work(1))</a:t>
+            </a:r>
+            <a:br>
+              <a:rPr lang="en-US" dirty="0" smtClean="0"/>
+            </a:br>
+            <a:r>
+              <a:rPr lang="en-US" dirty="0" smtClean="0"/>
+              <a:t>                = Increase in work / increase in wall-clock time</a:t>
             </a:r>
           </a:p>
           <a:p>
             <a:pPr lvl="1"/>
             <a:r>
               <a:rPr lang="en-US" dirty="0" smtClean="0"/>
-              <a:t>(Message size)</a:t>
-            </a:r>
-          </a:p>
-          <a:p>
-            <a:r>
-              <a:rPr lang="en-US" dirty="0" smtClean="0"/>
-              <a:t>System/ hardware:</a:t>
-            </a:r>
-          </a:p>
-          <a:p>
-            <a:pPr lvl="1"/>
-            <a:r>
-              <a:rPr lang="en-US" dirty="0" smtClean="0"/>
-              <a:t>Absolute performance (wall-clock time, time breakdown,…)</a:t>
-            </a:r>
-          </a:p>
-          <a:p>
-            <a:pPr lvl="1"/>
-            <a:r>
-              <a:rPr lang="en-US" dirty="0" smtClean="0"/>
-              <a:t>Speedup</a:t>
-            </a:r>
-          </a:p>
-          <a:p>
-            <a:pPr lvl="1"/>
-            <a:r>
-              <a:rPr lang="en-US" dirty="0" smtClean="0"/>
-              <a:t>Processing rate (FLOPS, queries/sec,…)</a:t>
-            </a:r>
-          </a:p>
-          <a:p>
-            <a:pPr lvl="1"/>
-            <a:r>
-              <a:rPr lang="en-US" dirty="0" smtClean="0"/>
-              <a:t>Utilization (CPU load, network load…)</a:t>
-            </a:r>
-          </a:p>
-          <a:p>
-            <a:pPr lvl="1"/>
-            <a:r>
-              <a:rPr lang="en-US" dirty="0" smtClean="0"/>
-              <a:t>Problem size (parallel efficiency, …)</a:t>
-            </a:r>
-          </a:p>
-          <a:p>
-            <a:pPr lvl="1"/>
-            <a:r>
-              <a:rPr lang="en-US" dirty="0" smtClean="0"/>
-              <a:t>Percentage improvement in performance (not recommended)</a:t>
-            </a:r>
-            <a:endParaRPr lang="en-US" dirty="0"/>
+              <a:t>“Others”</a:t>
+            </a:r>
           </a:p>
           <a:p>
             <a:endParaRPr lang="en-US" dirty="0"/>
@@ -3557,13 +3574,20 @@
     </p:spTree>
     <p:extLst>
       <p:ext uri="{BB962C8B-B14F-4D97-AF65-F5344CB8AC3E}">
-        <p14:creationId xmlns:p14="http://schemas.microsoft.com/office/powerpoint/2010/main" val="3397737450"/>
+        <p14:creationId xmlns:p14="http://schemas.microsoft.com/office/powerpoint/2010/main" val="1005066756"/>
       </p:ext>
     </p:extLst>
   </p:cSld>
   <p:clrMapOvr>
     <a:masterClrMapping/>
   </p:clrMapOvr>
+  <p:timing>
+    <p:tnLst>
+      <p:par>
+        <p:cTn id="1" dur="indefinite" restart="never" nodeType="tmRoot"/>
+      </p:par>
+    </p:tnLst>
+  </p:timing>
 </p:sld>
 </file>
 
@@ -3601,7 +3625,7 @@
           <a:p>
             <a:r>
               <a:rPr lang="en-US" dirty="0" smtClean="0"/>
-              <a:t>Step 4 – System and workload parameters</a:t>
+              <a:t>Step 3 - Metrics</a:t>
             </a:r>
             <a:endParaRPr lang="en-US" dirty="0"/>
           </a:p>
@@ -3619,62 +3643,101 @@
         </p:nvSpPr>
         <p:spPr/>
         <p:txBody>
-          <a:bodyPr/>
+          <a:bodyPr>
+            <a:normAutofit fontScale="92500" lnSpcReduction="10000"/>
+          </a:bodyPr>
           <a:lstStyle/>
           <a:p>
             <a:r>
               <a:rPr lang="en-US" dirty="0" smtClean="0"/>
-              <a:t>System:</a:t>
+              <a:t>Application:</a:t>
             </a:r>
           </a:p>
           <a:p>
             <a:pPr lvl="1"/>
             <a:r>
               <a:rPr lang="en-US" dirty="0" smtClean="0"/>
-              <a:t>#cores</a:t>
+              <a:t>Concurrency</a:t>
             </a:r>
           </a:p>
           <a:p>
             <a:pPr lvl="1"/>
             <a:r>
               <a:rPr lang="en-US" dirty="0" smtClean="0"/>
-              <a:t>#nodes (if distributed system)</a:t>
+              <a:t>Communication-to-computation ratio</a:t>
             </a:r>
           </a:p>
           <a:p>
             <a:pPr lvl="1"/>
             <a:r>
               <a:rPr lang="en-US" dirty="0" smtClean="0"/>
-              <a:t>Memory size, cache sizes, processor frequency, multi-threading, bus bandwidth,…</a:t>
+              <a:t>Synchronization and I/O frequency</a:t>
             </a:r>
           </a:p>
           <a:p>
             <a:pPr lvl="1"/>
             <a:r>
               <a:rPr lang="en-US" dirty="0" smtClean="0"/>
-              <a:t>Cache coherency scheme</a:t>
+              <a:t>Temporal and spatial locality</a:t>
             </a:r>
           </a:p>
           <a:p>
             <a:pPr lvl="1"/>
             <a:r>
               <a:rPr lang="en-US" dirty="0" smtClean="0"/>
-              <a:t>Synchronization primitive implementation, concurrent data structures</a:t>
+              <a:t>(Message size)</a:t>
+            </a:r>
+          </a:p>
+          <a:p>
+            <a:r>
+              <a:rPr lang="en-US" dirty="0" smtClean="0"/>
+              <a:t>System/ hardware:</a:t>
             </a:r>
           </a:p>
           <a:p>
             <a:pPr lvl="1"/>
             <a:r>
               <a:rPr lang="en-US" dirty="0" smtClean="0"/>
-              <a:t>Programming languages</a:t>
+              <a:t>Absolute performance (wall-clock time, time breakdown,…)</a:t>
             </a:r>
           </a:p>
           <a:p>
             <a:pPr lvl="1"/>
             <a:r>
               <a:rPr lang="en-US" dirty="0" smtClean="0"/>
-              <a:t>…</a:t>
-            </a:r>
+              <a:t>Speedup</a:t>
+            </a:r>
+          </a:p>
+          <a:p>
+            <a:pPr lvl="1"/>
+            <a:r>
+              <a:rPr lang="en-US" dirty="0" smtClean="0"/>
+              <a:t>Processing rate (FLOPS, queries/sec,…)</a:t>
+            </a:r>
+          </a:p>
+          <a:p>
+            <a:pPr lvl="1"/>
+            <a:r>
+              <a:rPr lang="en-US" dirty="0" smtClean="0"/>
+              <a:t>Utilization (CPU load, network load…)</a:t>
+            </a:r>
+          </a:p>
+          <a:p>
+            <a:pPr lvl="1"/>
+            <a:r>
+              <a:rPr lang="en-US" dirty="0" smtClean="0"/>
+              <a:t>Problem size (parallel efficiency, …)</a:t>
+            </a:r>
+          </a:p>
+          <a:p>
+            <a:pPr lvl="1"/>
+            <a:r>
+              <a:rPr lang="en-US" dirty="0" smtClean="0"/>
+              <a:t>Percentage improvement in performance (not recommended)</a:t>
+            </a:r>
+            <a:endParaRPr lang="en-US" dirty="0"/>
+          </a:p>
+          <a:p>
             <a:endParaRPr lang="en-US" dirty="0"/>
           </a:p>
         </p:txBody>
@@ -3682,7 +3745,7 @@
     </p:spTree>
     <p:extLst>
       <p:ext uri="{BB962C8B-B14F-4D97-AF65-F5344CB8AC3E}">
-        <p14:creationId xmlns:p14="http://schemas.microsoft.com/office/powerpoint/2010/main" val="2533161132"/>
+        <p14:creationId xmlns:p14="http://schemas.microsoft.com/office/powerpoint/2010/main" val="3397737450"/>
       </p:ext>
     </p:extLst>
   </p:cSld>
@@ -3749,79 +3812,65 @@
           <a:p>
             <a:r>
               <a:rPr lang="en-US" dirty="0" smtClean="0"/>
-              <a:t>Workload:</a:t>
-            </a:r>
-          </a:p>
-          <a:p>
-            <a:pPr marL="914400" lvl="1" indent="-457200">
-              <a:buFont typeface="+mj-lt"/>
-              <a:buAutoNum type="arabicPeriod"/>
-            </a:pPr>
-            <a:r>
-              <a:rPr lang="en-US" dirty="0" smtClean="0"/>
-              <a:t>Problem size</a:t>
-            </a:r>
-          </a:p>
-          <a:p>
-            <a:pPr marL="914400" lvl="1" indent="-457200">
-              <a:buFont typeface="+mj-lt"/>
-              <a:buAutoNum type="arabicPeriod"/>
-            </a:pPr>
-            <a:r>
-              <a:rPr lang="en-US" dirty="0" smtClean="0"/>
-              <a:t>Communication-computation ratio</a:t>
-            </a:r>
-          </a:p>
-          <a:p>
-            <a:pPr marL="914400" lvl="1" indent="-457200">
-              <a:buFont typeface="+mj-lt"/>
-              <a:buAutoNum type="arabicPeriod"/>
-            </a:pPr>
-            <a:r>
-              <a:rPr lang="en-US" dirty="0" smtClean="0"/>
-              <a:t>Execution time breakdown in different parts</a:t>
-            </a:r>
-          </a:p>
-          <a:p>
-            <a:pPr marL="914400" lvl="1" indent="-457200">
-              <a:buFont typeface="+mj-lt"/>
-              <a:buAutoNum type="arabicPeriod"/>
-            </a:pPr>
-            <a:r>
-              <a:rPr lang="en-US" dirty="0"/>
-              <a:t>L</a:t>
-            </a:r>
-            <a:r>
-              <a:rPr lang="en-US" dirty="0" smtClean="0"/>
-              <a:t>oad balance</a:t>
-            </a:r>
-          </a:p>
-          <a:p>
-            <a:pPr marL="914400" lvl="1" indent="-457200">
-              <a:buFont typeface="+mj-lt"/>
-              <a:buAutoNum type="arabicPeriod"/>
-            </a:pPr>
-            <a:r>
-              <a:rPr lang="en-US" dirty="0" smtClean="0"/>
-              <a:t>Temporal locality</a:t>
-            </a:r>
-          </a:p>
-          <a:p>
-            <a:pPr marL="914400" lvl="1" indent="-457200">
-              <a:buFont typeface="+mj-lt"/>
-              <a:buAutoNum type="arabicPeriod"/>
-            </a:pPr>
-            <a:r>
-              <a:rPr lang="en-US" dirty="0" smtClean="0"/>
-              <a:t>Spatial locality</a:t>
-            </a:r>
+              <a:t>System:</a:t>
+            </a:r>
+          </a:p>
+          <a:p>
+            <a:pPr lvl="1"/>
+            <a:r>
+              <a:rPr lang="en-US" dirty="0" smtClean="0"/>
+              <a:t>#cores</a:t>
+            </a:r>
+          </a:p>
+          <a:p>
+            <a:pPr lvl="1"/>
+            <a:r>
+              <a:rPr lang="en-US" dirty="0" smtClean="0"/>
+              <a:t>#nodes (if distributed system)</a:t>
+            </a:r>
+          </a:p>
+          <a:p>
+            <a:pPr lvl="1"/>
+            <a:r>
+              <a:rPr lang="en-US" dirty="0" smtClean="0"/>
+              <a:t>Memory size, cache sizes, processor frequency, multi-threading, bus bandwidth,…</a:t>
+            </a:r>
+          </a:p>
+          <a:p>
+            <a:pPr lvl="1"/>
+            <a:r>
+              <a:rPr lang="en-US" dirty="0" smtClean="0"/>
+              <a:t>Cache coherency scheme</a:t>
+            </a:r>
+          </a:p>
+          <a:p>
+            <a:pPr lvl="1"/>
+            <a:r>
+              <a:rPr lang="en-US" dirty="0" smtClean="0"/>
+              <a:t>Synchronization primitive implementation, concurrent data structures</a:t>
+            </a:r>
+          </a:p>
+          <a:p>
+            <a:pPr lvl="1"/>
+            <a:r>
+              <a:rPr lang="en-US" dirty="0" smtClean="0"/>
+              <a:t>Programming languages</a:t>
+            </a:r>
+          </a:p>
+          <a:p>
+            <a:pPr lvl="1"/>
+            <a:r>
+              <a:rPr lang="en-US" dirty="0" smtClean="0"/>
+              <a:t>…</a:t>
+            </a:r>
+            <a:endParaRPr lang="en-US" dirty="0"/>
           </a:p>
         </p:txBody>
       </p:sp>
     </p:spTree>
     <p:extLst>
       <p:ext uri="{BB962C8B-B14F-4D97-AF65-F5344CB8AC3E}">
-        <p14:creationId xmlns:p14="http://schemas.microsoft.com/office/powerpoint/2010/main" val="1139769152"/>
+        <p14:creationId xmlns:p14="http://schemas.microsoft.com/office/powerpoint/2010/main" val="2533161132"/>
       </p:ext>
     </p:extLst>
   </p:cSld>
@@ -3865,7 +3914,7 @@
           <a:p>
             <a:r>
               <a:rPr lang="en-US" dirty="0" smtClean="0"/>
-              <a:t>Step 5 – Factors and their values</a:t>
+              <a:t>Step 4 – System and workload parameters</a:t>
             </a:r>
             <a:endParaRPr lang="en-US" dirty="0"/>
           </a:p>
@@ -3888,65 +3937,79 @@
           <a:p>
             <a:r>
               <a:rPr lang="en-US" dirty="0" smtClean="0"/>
-              <a:t>System:</a:t>
-            </a:r>
-          </a:p>
-          <a:p>
-            <a:pPr lvl="1"/>
-            <a:r>
-              <a:rPr lang="en-US" dirty="0" smtClean="0"/>
-              <a:t>#cores: 1, 2, 4, 8, 16,…, N</a:t>
-            </a:r>
-          </a:p>
-          <a:p>
-            <a:pPr lvl="1"/>
-            <a:r>
-              <a:rPr lang="en-US" dirty="0" smtClean="0"/>
-              <a:t>#nodes: 1, 2, 4, 8, 16,…,N</a:t>
-            </a:r>
-          </a:p>
-          <a:p>
-            <a:pPr lvl="1"/>
-            <a:r>
-              <a:rPr lang="en-US" dirty="0" smtClean="0"/>
-              <a:t>Machine A vs. Machine B, vs. Machine C</a:t>
-            </a:r>
-          </a:p>
-          <a:p>
-            <a:pPr lvl="1"/>
-            <a:r>
-              <a:rPr lang="en-US" dirty="0" smtClean="0"/>
-              <a:t>Cache design A vs. proposed design B</a:t>
-            </a:r>
-          </a:p>
-          <a:p>
-            <a:pPr lvl="1"/>
-            <a:r>
-              <a:rPr lang="en-US" dirty="0" smtClean="0"/>
-              <a:t>De-facto standard systems vs. my system</a:t>
-            </a:r>
-          </a:p>
-          <a:p>
-            <a:pPr lvl="1"/>
-            <a:r>
-              <a:rPr lang="en-US" dirty="0" smtClean="0"/>
-              <a:t>Go vs. C</a:t>
-            </a:r>
-          </a:p>
-          <a:p>
-            <a:pPr lvl="1"/>
-            <a:r>
-              <a:rPr lang="en-US" dirty="0" smtClean="0"/>
-              <a:t>…</a:t>
-            </a:r>
-            <a:endParaRPr lang="en-US" dirty="0"/>
+              <a:t>Workload:</a:t>
+            </a:r>
+          </a:p>
+          <a:p>
+            <a:pPr marL="914400" lvl="1" indent="-457200">
+              <a:buFont typeface="+mj-lt"/>
+              <a:buAutoNum type="arabicPeriod"/>
+            </a:pPr>
+            <a:r>
+              <a:rPr lang="en-US" dirty="0" smtClean="0"/>
+              <a:t>Problem size</a:t>
+            </a:r>
+          </a:p>
+          <a:p>
+            <a:pPr marL="914400" lvl="1" indent="-457200">
+              <a:buFont typeface="+mj-lt"/>
+              <a:buAutoNum type="arabicPeriod"/>
+            </a:pPr>
+            <a:r>
+              <a:rPr lang="en-US" dirty="0" smtClean="0"/>
+              <a:t>Communication-computation ratio</a:t>
+            </a:r>
+          </a:p>
+          <a:p>
+            <a:pPr marL="914400" lvl="1" indent="-457200">
+              <a:buFont typeface="+mj-lt"/>
+              <a:buAutoNum type="arabicPeriod"/>
+            </a:pPr>
+            <a:r>
+              <a:rPr lang="en-US" dirty="0" smtClean="0"/>
+              <a:t>Execution time breakdown in different parts</a:t>
+            </a:r>
+          </a:p>
+          <a:p>
+            <a:pPr marL="914400" lvl="1" indent="-457200">
+              <a:buFont typeface="+mj-lt"/>
+              <a:buAutoNum type="arabicPeriod"/>
+            </a:pPr>
+            <a:r>
+              <a:rPr lang="en-US" dirty="0"/>
+              <a:t>L</a:t>
+            </a:r>
+            <a:r>
+              <a:rPr lang="en-US" dirty="0" smtClean="0"/>
+              <a:t>oad balance</a:t>
+            </a:r>
+          </a:p>
+          <a:p>
+            <a:pPr marL="914400" lvl="1" indent="-457200">
+              <a:buFont typeface="+mj-lt"/>
+              <a:buAutoNum type="arabicPeriod"/>
+            </a:pPr>
+            <a:r>
+              <a:rPr lang="en-US" dirty="0" smtClean="0"/>
+              <a:t>Temporal locality</a:t>
+            </a:r>
+          </a:p>
+          <a:p>
+            <a:pPr marL="914400" lvl="1" indent="-457200">
+              <a:buFont typeface="+mj-lt"/>
+              <a:buAutoNum type="arabicPeriod"/>
+            </a:pPr>
+            <a:r>
+              <a:rPr lang="en-US" dirty="0" smtClean="0"/>
+              <a:t>Spatial locality</a:t>
+            </a:r>
           </a:p>
         </p:txBody>
       </p:sp>
     </p:spTree>
     <p:extLst>
       <p:ext uri="{BB962C8B-B14F-4D97-AF65-F5344CB8AC3E}">
-        <p14:creationId xmlns:p14="http://schemas.microsoft.com/office/powerpoint/2010/main" val="1187439864"/>
+        <p14:creationId xmlns:p14="http://schemas.microsoft.com/office/powerpoint/2010/main" val="1139769152"/>
       </p:ext>
     </p:extLst>
   </p:cSld>
@@ -4013,74 +4076,57 @@
           <a:p>
             <a:r>
               <a:rPr lang="en-US" dirty="0" smtClean="0"/>
-              <a:t>Workload:</a:t>
+              <a:t>System:</a:t>
             </a:r>
           </a:p>
           <a:p>
             <a:pPr lvl="1"/>
             <a:r>
               <a:rPr lang="en-US" dirty="0" smtClean="0"/>
-              <a:t>Problem size: </a:t>
-            </a:r>
-          </a:p>
-          <a:p>
-            <a:pPr lvl="2"/>
-            <a:r>
-              <a:rPr lang="en-US" dirty="0" smtClean="0"/>
-              <a:t>High-level goals (new meteorological model)</a:t>
-            </a:r>
-          </a:p>
-          <a:p>
-            <a:pPr lvl="2"/>
-            <a:r>
-              <a:rPr lang="en-US" dirty="0" smtClean="0"/>
-              <a:t>Simulator, small, medium, large (predefined)</a:t>
-            </a:r>
-          </a:p>
-          <a:p>
-            <a:pPr lvl="2"/>
-            <a:r>
-              <a:rPr lang="en-US" dirty="0" smtClean="0"/>
-              <a:t>Realistic sizes</a:t>
+              <a:t>#cores: 1, 2, 4, 8, 16,…, N</a:t>
             </a:r>
           </a:p>
           <a:p>
             <a:pPr lvl="1"/>
             <a:r>
               <a:rPr lang="en-US" dirty="0" smtClean="0"/>
-              <a:t>Inherent behavioral:</a:t>
-            </a:r>
-          </a:p>
-          <a:p>
-            <a:pPr lvl="2"/>
-            <a:r>
-              <a:rPr lang="en-US" dirty="0" smtClean="0"/>
-              <a:t>Stress different parts of the system (many problem sizes)</a:t>
-            </a:r>
-          </a:p>
-          <a:p>
-            <a:pPr lvl="2"/>
-            <a:r>
-              <a:rPr lang="en-US" dirty="0" smtClean="0"/>
-              <a:t>Most realistic usage</a:t>
+              <a:t>#nodes: 1, 2, 4, 8, 16,…,N</a:t>
             </a:r>
           </a:p>
           <a:p>
             <a:pPr lvl="1"/>
             <a:r>
               <a:rPr lang="en-US" dirty="0" smtClean="0"/>
-              <a:t>Temporal and spatial locality:</a:t>
-            </a:r>
-          </a:p>
-          <a:p>
-            <a:pPr lvl="2"/>
-            <a:r>
-              <a:rPr lang="en-US" dirty="0" smtClean="0"/>
-              <a:t>Realistic working sets</a:t>
-            </a:r>
-          </a:p>
-          <a:p>
-            <a:pPr lvl="2"/>
+              <a:t>Machine A vs. Machine B, vs. Machine C</a:t>
+            </a:r>
+          </a:p>
+          <a:p>
+            <a:pPr lvl="1"/>
+            <a:r>
+              <a:rPr lang="en-US" dirty="0" smtClean="0"/>
+              <a:t>Cache design A vs. proposed design B</a:t>
+            </a:r>
+          </a:p>
+          <a:p>
+            <a:pPr lvl="1"/>
+            <a:r>
+              <a:rPr lang="en-US" dirty="0" smtClean="0"/>
+              <a:t>De-facto standard systems vs. my system</a:t>
+            </a:r>
+          </a:p>
+          <a:p>
+            <a:pPr lvl="1"/>
+            <a:r>
+              <a:rPr lang="en-US" dirty="0" smtClean="0"/>
+              <a:t>Go vs. C</a:t>
+            </a:r>
+          </a:p>
+          <a:p>
+            <a:pPr lvl="1"/>
+            <a:r>
+              <a:rPr lang="en-US" dirty="0" smtClean="0"/>
+              <a:t>…</a:t>
+            </a:r>
             <a:endParaRPr lang="en-US" dirty="0"/>
           </a:p>
         </p:txBody>
@@ -4088,7 +4134,7 @@
     </p:spTree>
     <p:extLst>
       <p:ext uri="{BB962C8B-B14F-4D97-AF65-F5344CB8AC3E}">
-        <p14:creationId xmlns:p14="http://schemas.microsoft.com/office/powerpoint/2010/main" val="170683574"/>
+        <p14:creationId xmlns:p14="http://schemas.microsoft.com/office/powerpoint/2010/main" val="1187439864"/>
       </p:ext>
     </p:extLst>
   </p:cSld>
@@ -4132,7 +4178,7 @@
           <a:p>
             <a:r>
               <a:rPr lang="en-US" dirty="0" smtClean="0"/>
-              <a:t>Step 6 – Evaluation techniques</a:t>
+              <a:t>Step 5 – Factors and their values</a:t>
             </a:r>
             <a:endParaRPr lang="en-US" dirty="0"/>
           </a:p>
@@ -4155,22 +4201,74 @@
           <a:p>
             <a:r>
               <a:rPr lang="en-US" dirty="0" smtClean="0"/>
-              <a:t>Real machine or system: performance measurements</a:t>
-            </a:r>
-          </a:p>
-          <a:p>
-            <a:r>
-              <a:rPr lang="en-US" dirty="0" smtClean="0"/>
-              <a:t>Architectural or system idea or trade-off: simulation</a:t>
-            </a:r>
-          </a:p>
-          <a:p>
-            <a:r>
-              <a:rPr lang="en-US" dirty="0" smtClean="0"/>
-              <a:t>Application design ideas: modeling or simulation</a:t>
-            </a:r>
-          </a:p>
-          <a:p>
+              <a:t>Workload:</a:t>
+            </a:r>
+          </a:p>
+          <a:p>
+            <a:pPr lvl="1"/>
+            <a:r>
+              <a:rPr lang="en-US" dirty="0" smtClean="0"/>
+              <a:t>Problem size: </a:t>
+            </a:r>
+          </a:p>
+          <a:p>
+            <a:pPr lvl="2"/>
+            <a:r>
+              <a:rPr lang="en-US" dirty="0" smtClean="0"/>
+              <a:t>High-level goals (new meteorological model)</a:t>
+            </a:r>
+          </a:p>
+          <a:p>
+            <a:pPr lvl="2"/>
+            <a:r>
+              <a:rPr lang="en-US" dirty="0" smtClean="0"/>
+              <a:t>Simulator, small, medium, large (predefined)</a:t>
+            </a:r>
+          </a:p>
+          <a:p>
+            <a:pPr lvl="2"/>
+            <a:r>
+              <a:rPr lang="en-US" dirty="0" smtClean="0"/>
+              <a:t>Realistic sizes</a:t>
+            </a:r>
+          </a:p>
+          <a:p>
+            <a:pPr lvl="1"/>
+            <a:r>
+              <a:rPr lang="en-US" dirty="0" smtClean="0"/>
+              <a:t>Inherent behavioral:</a:t>
+            </a:r>
+          </a:p>
+          <a:p>
+            <a:pPr lvl="2"/>
+            <a:r>
+              <a:rPr lang="en-US" dirty="0" smtClean="0"/>
+              <a:t>Stress different parts of the system (many problem sizes)</a:t>
+            </a:r>
+          </a:p>
+          <a:p>
+            <a:pPr lvl="2"/>
+            <a:r>
+              <a:rPr lang="en-US" dirty="0" smtClean="0"/>
+              <a:t>Most realistic usage</a:t>
+            </a:r>
+          </a:p>
+          <a:p>
+            <a:pPr lvl="1"/>
+            <a:r>
+              <a:rPr lang="en-US" dirty="0" smtClean="0"/>
+              <a:t>Temporal and spatial locality:</a:t>
+            </a:r>
+          </a:p>
+          <a:p>
+            <a:pPr lvl="2"/>
+            <a:r>
+              <a:rPr lang="en-US" dirty="0" smtClean="0"/>
+              <a:t>Realistic working sets</a:t>
+            </a:r>
+          </a:p>
+          <a:p>
+            <a:pPr lvl="2"/>
             <a:endParaRPr lang="en-US" dirty="0"/>
           </a:p>
         </p:txBody>
@@ -4178,7 +4276,7 @@
     </p:spTree>
     <p:extLst>
       <p:ext uri="{BB962C8B-B14F-4D97-AF65-F5344CB8AC3E}">
-        <p14:creationId xmlns:p14="http://schemas.microsoft.com/office/powerpoint/2010/main" val="1833492107"/>
+        <p14:creationId xmlns:p14="http://schemas.microsoft.com/office/powerpoint/2010/main" val="170683574"/>
       </p:ext>
     </p:extLst>
   </p:cSld>
@@ -4222,7 +4320,7 @@
           <a:p>
             <a:r>
               <a:rPr lang="en-US" dirty="0" smtClean="0"/>
-              <a:t>Step 7 – Select workload</a:t>
+              <a:t>Step 6 – Evaluation techniques</a:t>
             </a:r>
             <a:endParaRPr lang="en-US" dirty="0"/>
           </a:p>
@@ -4245,41 +4343,22 @@
           <a:p>
             <a:r>
               <a:rPr lang="en-US" dirty="0" smtClean="0"/>
-              <a:t>Kernels, applications, or application suites</a:t>
-            </a:r>
-          </a:p>
-          <a:p>
-            <a:r>
-              <a:rPr lang="en-US" dirty="0" smtClean="0"/>
-              <a:t>Input data size and algorithm parameters</a:t>
-            </a:r>
-          </a:p>
-          <a:p>
-            <a:r>
-              <a:rPr lang="en-US" dirty="0" smtClean="0"/>
-              <a:t>Important properties:</a:t>
-            </a:r>
-          </a:p>
-          <a:p>
-            <a:pPr lvl="1"/>
-            <a:r>
-              <a:rPr lang="en-US" dirty="0" smtClean="0"/>
-              <a:t>Representativeness</a:t>
-            </a:r>
-          </a:p>
-          <a:p>
-            <a:pPr lvl="1"/>
-            <a:r>
-              <a:rPr lang="en-US" dirty="0" smtClean="0"/>
-              <a:t>Coverage of behavioral properties</a:t>
-            </a:r>
-          </a:p>
-          <a:p>
-            <a:pPr lvl="1"/>
-            <a:r>
-              <a:rPr lang="en-US" dirty="0" smtClean="0"/>
-              <a:t>Enough concurrency and load balanced</a:t>
-            </a:r>
+              <a:t>Real machine or system: performance measurements</a:t>
+            </a:r>
+          </a:p>
+          <a:p>
+            <a:r>
+              <a:rPr lang="en-US" dirty="0" smtClean="0"/>
+              <a:t>Architectural or system idea or trade-off: simulation</a:t>
+            </a:r>
+          </a:p>
+          <a:p>
+            <a:r>
+              <a:rPr lang="en-US" dirty="0" smtClean="0"/>
+              <a:t>Application design ideas: modeling or simulation</a:t>
+            </a:r>
+          </a:p>
+          <a:p>
             <a:endParaRPr lang="en-US" dirty="0"/>
           </a:p>
         </p:txBody>
@@ -4287,7 +4366,7 @@
     </p:spTree>
     <p:extLst>
       <p:ext uri="{BB962C8B-B14F-4D97-AF65-F5344CB8AC3E}">
-        <p14:creationId xmlns:p14="http://schemas.microsoft.com/office/powerpoint/2010/main" val="3325308880"/>
+        <p14:creationId xmlns:p14="http://schemas.microsoft.com/office/powerpoint/2010/main" val="1833492107"/>
       </p:ext>
     </p:extLst>
   </p:cSld>
@@ -4331,7 +4410,7 @@
           <a:p>
             <a:r>
               <a:rPr lang="en-US" dirty="0" smtClean="0"/>
-              <a:t>Optimization</a:t>
+              <a:t>Step 7 – Select workload</a:t>
             </a:r>
             <a:endParaRPr lang="en-US" dirty="0"/>
           </a:p>
@@ -4354,48 +4433,40 @@
           <a:p>
             <a:r>
               <a:rPr lang="en-US" dirty="0" smtClean="0"/>
-              <a:t>How much should benchmarks be optimized?</a:t>
+              <a:t>Kernels, applications, or application suites</a:t>
+            </a:r>
+          </a:p>
+          <a:p>
+            <a:r>
+              <a:rPr lang="en-US" dirty="0" smtClean="0"/>
+              <a:t>Input data size and algorithm parameters</a:t>
+            </a:r>
+          </a:p>
+          <a:p>
+            <a:r>
+              <a:rPr lang="en-US" dirty="0" smtClean="0"/>
+              <a:t>Important properties:</a:t>
             </a:r>
           </a:p>
           <a:p>
             <a:pPr lvl="1"/>
             <a:r>
               <a:rPr lang="en-US" dirty="0" smtClean="0"/>
-              <a:t>Different levels stress different parts of system</a:t>
-            </a:r>
-          </a:p>
-          <a:p>
-            <a:r>
-              <a:rPr lang="en-US" dirty="0" smtClean="0"/>
-              <a:t>Types of optimizations:</a:t>
+              <a:t>Representativeness</a:t>
             </a:r>
           </a:p>
           <a:p>
             <a:pPr lvl="1"/>
             <a:r>
               <a:rPr lang="en-US" dirty="0" smtClean="0"/>
-              <a:t>Algorithmic (decomposition and assignment)</a:t>
+              <a:t>Coverage of behavioral properties</a:t>
             </a:r>
           </a:p>
           <a:p>
             <a:pPr lvl="1"/>
             <a:r>
               <a:rPr lang="en-US" dirty="0" smtClean="0"/>
-              <a:t>Data structuring</a:t>
-            </a:r>
-          </a:p>
-          <a:p>
-            <a:pPr lvl="1"/>
-            <a:r>
-              <a:rPr lang="en-US" dirty="0" smtClean="0"/>
-              <a:t>Data layout, distribution, and alignment</a:t>
-            </a:r>
-          </a:p>
-          <a:p>
-            <a:pPr lvl="1"/>
-            <a:r>
-              <a:rPr lang="en-US" dirty="0" smtClean="0"/>
-              <a:t>Orchestrating of communication and synchronization</a:t>
+              <a:t>Enough concurrency and load balanced</a:t>
             </a:r>
             <a:endParaRPr lang="en-US" dirty="0"/>
           </a:p>
@@ -4404,7 +4475,7 @@
     </p:spTree>
     <p:extLst>
       <p:ext uri="{BB962C8B-B14F-4D97-AF65-F5344CB8AC3E}">
-        <p14:creationId xmlns:p14="http://schemas.microsoft.com/office/powerpoint/2010/main" val="2591192694"/>
+        <p14:creationId xmlns:p14="http://schemas.microsoft.com/office/powerpoint/2010/main" val="3325308880"/>
       </p:ext>
     </p:extLst>
   </p:cSld>
@@ -4448,7 +4519,7 @@
           <a:p>
             <a:r>
               <a:rPr lang="en-US" dirty="0" smtClean="0"/>
-              <a:t>Step 8 – Design the experiments</a:t>
+              <a:t>Optimization</a:t>
             </a:r>
             <a:endParaRPr lang="en-US" dirty="0"/>
           </a:p>
@@ -4471,50 +4542,48 @@
           <a:p>
             <a:r>
               <a:rPr lang="en-US" dirty="0" smtClean="0"/>
-              <a:t>Performance isolation (</a:t>
-            </a:r>
-            <a:r>
-              <a:rPr lang="en-US" dirty="0" err="1" smtClean="0"/>
-              <a:t>microbenchmarks</a:t>
-            </a:r>
-            <a:r>
-              <a:rPr lang="en-US" dirty="0" smtClean="0"/>
-              <a:t>)</a:t>
+              <a:t>How much should benchmarks be optimized?</a:t>
             </a:r>
           </a:p>
           <a:p>
             <a:pPr lvl="1"/>
             <a:r>
               <a:rPr lang="en-US" dirty="0" smtClean="0"/>
-              <a:t>Processing (non-memory accessing operations)</a:t>
+              <a:t>Different levels stress different parts of system</a:t>
+            </a:r>
+          </a:p>
+          <a:p>
+            <a:r>
+              <a:rPr lang="en-US" dirty="0" smtClean="0"/>
+              <a:t>Types of optimizations:</a:t>
             </a:r>
           </a:p>
           <a:p>
             <a:pPr lvl="1"/>
             <a:r>
               <a:rPr lang="en-US" dirty="0" smtClean="0"/>
-              <a:t>Local memory (latencies at different cache levels)</a:t>
+              <a:t>Algorithmic (decomposition and assignment)</a:t>
             </a:r>
           </a:p>
           <a:p>
             <a:pPr lvl="1"/>
             <a:r>
               <a:rPr lang="en-US" dirty="0" smtClean="0"/>
-              <a:t>I/O (disk read/write)</a:t>
+              <a:t>Data structuring</a:t>
             </a:r>
           </a:p>
           <a:p>
             <a:pPr lvl="1"/>
             <a:r>
               <a:rPr lang="en-US" dirty="0" smtClean="0"/>
-              <a:t>Communication (remote reads/writes)</a:t>
+              <a:t>Data layout, distribution, and alignment</a:t>
             </a:r>
           </a:p>
           <a:p>
             <a:pPr lvl="1"/>
             <a:r>
               <a:rPr lang="en-US" dirty="0" smtClean="0"/>
-              <a:t>Synchronization</a:t>
+              <a:t>Orchestrating of communication and synchronization</a:t>
             </a:r>
             <a:endParaRPr lang="en-US" dirty="0"/>
           </a:p>
@@ -4523,7 +4592,7 @@
     </p:spTree>
     <p:extLst>
       <p:ext uri="{BB962C8B-B14F-4D97-AF65-F5344CB8AC3E}">
-        <p14:creationId xmlns:p14="http://schemas.microsoft.com/office/powerpoint/2010/main" val="783749851"/>
+        <p14:creationId xmlns:p14="http://schemas.microsoft.com/office/powerpoint/2010/main" val="2591192694"/>
       </p:ext>
     </p:extLst>
   </p:cSld>
@@ -4567,7 +4636,7 @@
           <a:p>
             <a:r>
               <a:rPr lang="en-US" dirty="0" smtClean="0"/>
-              <a:t>Steps 9 and 10 – analyze, interpret, and present results</a:t>
+              <a:t>Step 8 – Design the experiments</a:t>
             </a:r>
             <a:endParaRPr lang="en-US" dirty="0"/>
           </a:p>
@@ -4590,7 +4659,50 @@
           <a:p>
             <a:r>
               <a:rPr lang="en-US" dirty="0" smtClean="0"/>
-              <a:t>Will skip this part</a:t>
+              <a:t>Performance isolation (</a:t>
+            </a:r>
+            <a:r>
+              <a:rPr lang="en-US" dirty="0" err="1" smtClean="0"/>
+              <a:t>microbenchmarks</a:t>
+            </a:r>
+            <a:r>
+              <a:rPr lang="en-US" dirty="0" smtClean="0"/>
+              <a:t>)</a:t>
+            </a:r>
+          </a:p>
+          <a:p>
+            <a:pPr lvl="1"/>
+            <a:r>
+              <a:rPr lang="en-US" dirty="0" smtClean="0"/>
+              <a:t>Processing (non-memory accessing operations)</a:t>
+            </a:r>
+          </a:p>
+          <a:p>
+            <a:pPr lvl="1"/>
+            <a:r>
+              <a:rPr lang="en-US" dirty="0" smtClean="0"/>
+              <a:t>Local memory (latencies at different cache levels)</a:t>
+            </a:r>
+          </a:p>
+          <a:p>
+            <a:pPr lvl="1"/>
+            <a:r>
+              <a:rPr lang="en-US" dirty="0" smtClean="0"/>
+              <a:t>I/O (disk read/write)</a:t>
+            </a:r>
+          </a:p>
+          <a:p>
+            <a:pPr lvl="1"/>
+            <a:r>
+              <a:rPr lang="en-US" dirty="0" smtClean="0"/>
+              <a:t>Communication (remote reads/writes)</a:t>
+            </a:r>
+          </a:p>
+          <a:p>
+            <a:pPr lvl="1"/>
+            <a:r>
+              <a:rPr lang="en-US" dirty="0" smtClean="0"/>
+              <a:t>Synchronization</a:t>
             </a:r>
             <a:endParaRPr lang="en-US" dirty="0"/>
           </a:p>
@@ -4599,7 +4711,7 @@
     </p:spTree>
     <p:extLst>
       <p:ext uri="{BB962C8B-B14F-4D97-AF65-F5344CB8AC3E}">
-        <p14:creationId xmlns:p14="http://schemas.microsoft.com/office/powerpoint/2010/main" val="1272955762"/>
+        <p14:creationId xmlns:p14="http://schemas.microsoft.com/office/powerpoint/2010/main" val="783749851"/>
       </p:ext>
     </p:extLst>
   </p:cSld>
@@ -4643,49 +4755,40 @@
           <a:p>
             <a:r>
               <a:rPr lang="en-US" dirty="0" smtClean="0"/>
-              <a:t>Outline</a:t>
+              <a:t>Source / recommended reading</a:t>
             </a:r>
             <a:endParaRPr lang="en-US" dirty="0"/>
           </a:p>
         </p:txBody>
       </p:sp>
-      <p:sp>
-        <p:nvSpPr>
-          <p:cNvPr id="3" name="Content Placeholder 2"/>
-          <p:cNvSpPr>
-            <a:spLocks noGrp="1"/>
-          </p:cNvSpPr>
-          <p:nvPr>
-            <p:ph idx="1"/>
-          </p:nvPr>
-        </p:nvSpPr>
-        <p:spPr/>
-        <p:txBody>
-          <a:bodyPr/>
-          <a:lstStyle/>
-          <a:p>
-            <a:r>
-              <a:rPr lang="en-US" dirty="0" smtClean="0"/>
-              <a:t>Parallel program </a:t>
-            </a:r>
-            <a:r>
-              <a:rPr lang="en-US" dirty="0" smtClean="0"/>
-              <a:t>evaluation</a:t>
-            </a:r>
-          </a:p>
-          <a:p>
-            <a:r>
-              <a:rPr lang="en-US" dirty="0" smtClean="0"/>
-              <a:t>Using deduplication as a case study</a:t>
-            </a:r>
-            <a:endParaRPr lang="en-US" dirty="0" smtClean="0"/>
-          </a:p>
-        </p:txBody>
-      </p:sp>
+      <p:pic>
+        <p:nvPicPr>
+          <p:cNvPr id="9" name="Picture 8"/>
+          <p:cNvPicPr>
+            <a:picLocks noChangeAspect="1"/>
+          </p:cNvPicPr>
+          <p:nvPr/>
+        </p:nvPicPr>
+        <p:blipFill>
+          <a:blip r:embed="rId2"/>
+          <a:stretch>
+            <a:fillRect/>
+          </a:stretch>
+        </p:blipFill>
+        <p:spPr>
+          <a:xfrm>
+            <a:off x="2604393" y="2006989"/>
+            <a:ext cx="3810000" cy="3810000"/>
+          </a:xfrm>
+          <a:prstGeom prst="rect">
+            <a:avLst/>
+          </a:prstGeom>
+        </p:spPr>
+      </p:pic>
     </p:spTree>
     <p:extLst>
       <p:ext uri="{BB962C8B-B14F-4D97-AF65-F5344CB8AC3E}">
-        <p14:creationId xmlns:p14="http://schemas.microsoft.com/office/powerpoint/2010/main" val="301408162"/>
+        <p14:creationId xmlns:p14="http://schemas.microsoft.com/office/powerpoint/2010/main" val="453105248"/>
       </p:ext>
     </p:extLst>
   </p:cSld>
@@ -4736,7 +4839,7 @@
           <a:p>
             <a:r>
               <a:rPr lang="en-US" dirty="0" smtClean="0"/>
-              <a:t>Summary</a:t>
+              <a:t>Steps 9 and 10 – analyze, interpret, and present results</a:t>
             </a:r>
             <a:endParaRPr lang="en-US" dirty="0"/>
           </a:p>
@@ -4759,6 +4862,82 @@
           <a:p>
             <a:r>
               <a:rPr lang="en-US" dirty="0" smtClean="0"/>
+              <a:t>Will skip this part</a:t>
+            </a:r>
+            <a:endParaRPr lang="en-US" dirty="0"/>
+          </a:p>
+        </p:txBody>
+      </p:sp>
+    </p:spTree>
+    <p:extLst>
+      <p:ext uri="{BB962C8B-B14F-4D97-AF65-F5344CB8AC3E}">
+        <p14:creationId xmlns:p14="http://schemas.microsoft.com/office/powerpoint/2010/main" val="1272955762"/>
+      </p:ext>
+    </p:extLst>
+  </p:cSld>
+  <p:clrMapOvr>
+    <a:masterClrMapping/>
+  </p:clrMapOvr>
+</p:sld>
+</file>
+
+<file path=ppt/slides/slide21.xml><?xml version="1.0" encoding="utf-8"?>
+<p:sld xmlns:a="http://schemas.openxmlformats.org/drawingml/2006/main" xmlns:r="http://schemas.openxmlformats.org/officeDocument/2006/relationships" xmlns:p="http://schemas.openxmlformats.org/presentationml/2006/main">
+  <p:cSld>
+    <p:spTree>
+      <p:nvGrpSpPr>
+        <p:cNvPr id="1" name=""/>
+        <p:cNvGrpSpPr/>
+        <p:nvPr/>
+      </p:nvGrpSpPr>
+      <p:grpSpPr>
+        <a:xfrm>
+          <a:off x="0" y="0"/>
+          <a:ext cx="0" cy="0"/>
+          <a:chOff x="0" y="0"/>
+          <a:chExt cx="0" cy="0"/>
+        </a:xfrm>
+      </p:grpSpPr>
+      <p:sp>
+        <p:nvSpPr>
+          <p:cNvPr id="2" name="Title 1"/>
+          <p:cNvSpPr>
+            <a:spLocks noGrp="1"/>
+          </p:cNvSpPr>
+          <p:nvPr>
+            <p:ph type="title"/>
+          </p:nvPr>
+        </p:nvSpPr>
+        <p:spPr/>
+        <p:txBody>
+          <a:bodyPr/>
+          <a:lstStyle/>
+          <a:p>
+            <a:r>
+              <a:rPr lang="en-US" dirty="0" smtClean="0"/>
+              <a:t>Summary</a:t>
+            </a:r>
+            <a:endParaRPr lang="en-US" dirty="0"/>
+          </a:p>
+        </p:txBody>
+      </p:sp>
+      <p:sp>
+        <p:nvSpPr>
+          <p:cNvPr id="3" name="Content Placeholder 2"/>
+          <p:cNvSpPr>
+            <a:spLocks noGrp="1"/>
+          </p:cNvSpPr>
+          <p:nvPr>
+            <p:ph idx="1"/>
+          </p:nvPr>
+        </p:nvSpPr>
+        <p:spPr/>
+        <p:txBody>
+          <a:bodyPr/>
+          <a:lstStyle/>
+          <a:p>
+            <a:r>
+              <a:rPr lang="en-US" dirty="0" smtClean="0"/>
               <a:t>Most “standard” performance evaluation techniques and practices apply</a:t>
             </a:r>
           </a:p>
@@ -4772,11 +4951,7 @@
             <a:pPr lvl="1"/>
             <a:r>
               <a:rPr lang="en-US" dirty="0" smtClean="0"/>
-              <a:t>Scalability very </a:t>
-            </a:r>
-            <a:r>
-              <a:rPr lang="en-US" dirty="0" smtClean="0"/>
-              <a:t>important</a:t>
+              <a:t>Scalability very important</a:t>
             </a:r>
           </a:p>
           <a:p>
@@ -4832,23 +5007,14 @@
             <p:ph type="title"/>
           </p:nvPr>
         </p:nvSpPr>
-        <p:spPr>
-          <a:xfrm>
-            <a:off x="556249" y="300207"/>
-            <a:ext cx="8133831" cy="1216926"/>
-          </a:xfrm>
-        </p:spPr>
+        <p:spPr/>
         <p:txBody>
           <a:bodyPr/>
           <a:lstStyle/>
           <a:p>
             <a:r>
               <a:rPr lang="en-US" dirty="0" smtClean="0"/>
-              <a:t>Steps </a:t>
-            </a:r>
-            <a:r>
-              <a:rPr lang="en-US" dirty="0" smtClean="0"/>
-              <a:t>for a performance evaluation study</a:t>
+              <a:t>Outline</a:t>
             </a:r>
             <a:endParaRPr lang="en-US" dirty="0"/>
           </a:p>
@@ -4866,117 +5032,26 @@
         </p:nvSpPr>
         <p:spPr/>
         <p:txBody>
-          <a:bodyPr>
-            <a:normAutofit lnSpcReduction="10000"/>
-          </a:bodyPr>
+          <a:bodyPr/>
           <a:lstStyle/>
           <a:p>
-            <a:pPr marL="457200" indent="-457200">
-              <a:buFont typeface="+mj-lt"/>
-              <a:buAutoNum type="arabicPeriod"/>
-            </a:pPr>
-            <a:r>
-              <a:rPr lang="en-US" dirty="0" smtClean="0"/>
-              <a:t>State the goals of the study and define the system boundaries</a:t>
-            </a:r>
-          </a:p>
-          <a:p>
-            <a:pPr marL="457200" indent="-457200">
-              <a:buFont typeface="+mj-lt"/>
-              <a:buAutoNum type="arabicPeriod"/>
-            </a:pPr>
-            <a:r>
-              <a:rPr lang="en-US" dirty="0" smtClean="0"/>
-              <a:t>List system services and possible outcomes</a:t>
-            </a:r>
-          </a:p>
-          <a:p>
-            <a:pPr marL="457200" indent="-457200">
-              <a:buFont typeface="+mj-lt"/>
-              <a:buAutoNum type="arabicPeriod"/>
-            </a:pPr>
-            <a:r>
-              <a:rPr lang="en-US" dirty="0" smtClean="0"/>
-              <a:t>Select performance metrics</a:t>
-            </a:r>
-          </a:p>
-          <a:p>
-            <a:pPr marL="457200" indent="-457200">
-              <a:buFont typeface="+mj-lt"/>
-              <a:buAutoNum type="arabicPeriod"/>
-            </a:pPr>
-            <a:r>
-              <a:rPr lang="en-US" dirty="0" smtClean="0"/>
-              <a:t>List system and workload parameters</a:t>
-            </a:r>
-          </a:p>
-          <a:p>
-            <a:pPr marL="457200" indent="-457200">
-              <a:buFont typeface="+mj-lt"/>
-              <a:buAutoNum type="arabicPeriod"/>
-            </a:pPr>
-            <a:r>
-              <a:rPr lang="en-US" dirty="0" smtClean="0"/>
-              <a:t>Select factors and their values</a:t>
-            </a:r>
-          </a:p>
-          <a:p>
-            <a:pPr marL="457200" indent="-457200">
-              <a:buFont typeface="+mj-lt"/>
-              <a:buAutoNum type="arabicPeriod"/>
-            </a:pPr>
-            <a:r>
-              <a:rPr lang="en-US" dirty="0" smtClean="0"/>
-              <a:t>Select evaluation techniques</a:t>
-            </a:r>
-          </a:p>
-          <a:p>
-            <a:pPr marL="457200" indent="-457200">
-              <a:buFont typeface="+mj-lt"/>
-              <a:buAutoNum type="arabicPeriod"/>
-            </a:pPr>
-            <a:r>
-              <a:rPr lang="en-US" dirty="0" smtClean="0"/>
-              <a:t>Select the workload</a:t>
-            </a:r>
-          </a:p>
-          <a:p>
-            <a:pPr marL="457200" indent="-457200">
-              <a:buFont typeface="+mj-lt"/>
-              <a:buAutoNum type="arabicPeriod"/>
-            </a:pPr>
-            <a:r>
-              <a:rPr lang="en-US" dirty="0" smtClean="0"/>
-              <a:t>Design the experiments</a:t>
-            </a:r>
-          </a:p>
-          <a:p>
-            <a:pPr marL="457200" indent="-457200">
-              <a:buFont typeface="+mj-lt"/>
-              <a:buAutoNum type="arabicPeriod"/>
-            </a:pPr>
-            <a:r>
-              <a:rPr lang="en-US" dirty="0" smtClean="0"/>
-              <a:t>Analyze and interpret the data</a:t>
-            </a:r>
-          </a:p>
-          <a:p>
-            <a:pPr marL="457200" indent="-457200">
-              <a:buFont typeface="+mj-lt"/>
-              <a:buAutoNum type="arabicPeriod"/>
-            </a:pPr>
-            <a:r>
-              <a:rPr lang="en-US" dirty="0" smtClean="0"/>
-              <a:t>Presents the results. Start over, if necessary</a:t>
-            </a:r>
-            <a:endParaRPr lang="en-US" dirty="0"/>
+            <a:r>
+              <a:rPr lang="en-US" dirty="0" smtClean="0"/>
+              <a:t>Parallel program evaluation</a:t>
+            </a:r>
+          </a:p>
+          <a:p>
+            <a:r>
+              <a:rPr lang="en-US" dirty="0" smtClean="0"/>
+              <a:t>Using deduplication as a case study</a:t>
+            </a:r>
           </a:p>
         </p:txBody>
       </p:sp>
     </p:spTree>
     <p:extLst>
       <p:ext uri="{BB962C8B-B14F-4D97-AF65-F5344CB8AC3E}">
-        <p14:creationId xmlns:p14="http://schemas.microsoft.com/office/powerpoint/2010/main" val="2112818678"/>
+        <p14:creationId xmlns:p14="http://schemas.microsoft.com/office/powerpoint/2010/main" val="301408162"/>
       </p:ext>
     </p:extLst>
   </p:cSld>
@@ -5020,14 +5095,19 @@
             <p:ph type="title"/>
           </p:nvPr>
         </p:nvSpPr>
-        <p:spPr/>
+        <p:spPr>
+          <a:xfrm>
+            <a:off x="556249" y="300207"/>
+            <a:ext cx="8133831" cy="1216926"/>
+          </a:xfrm>
+        </p:spPr>
         <p:txBody>
           <a:bodyPr/>
           <a:lstStyle/>
           <a:p>
             <a:r>
               <a:rPr lang="en-US" dirty="0" smtClean="0"/>
-              <a:t>Step 1 – System boundary and goals</a:t>
+              <a:t>Steps for a performance evaluation study</a:t>
             </a:r>
             <a:endParaRPr lang="en-US" dirty="0"/>
           </a:p>
@@ -5045,45 +5125,109 @@
         </p:nvSpPr>
         <p:spPr/>
         <p:txBody>
-          <a:bodyPr/>
+          <a:bodyPr>
+            <a:normAutofit lnSpcReduction="10000"/>
+          </a:bodyPr>
           <a:lstStyle/>
           <a:p>
-            <a:r>
-              <a:rPr lang="en-US" dirty="0" smtClean="0"/>
-              <a:t>Application</a:t>
-            </a:r>
-          </a:p>
-          <a:p>
-            <a:r>
-              <a:rPr lang="en-US" dirty="0" smtClean="0"/>
-              <a:t>System software</a:t>
-            </a:r>
-          </a:p>
-          <a:p>
-            <a:r>
-              <a:rPr lang="en-US" dirty="0" smtClean="0"/>
-              <a:t>Real machine</a:t>
-            </a:r>
-          </a:p>
-          <a:p>
-            <a:r>
-              <a:rPr lang="en-US" dirty="0" smtClean="0"/>
-              <a:t>System or architecture ideas and trade-off</a:t>
-            </a:r>
-          </a:p>
-          <a:p>
-            <a:endParaRPr lang="en-US" dirty="0"/>
-          </a:p>
-          <a:p>
-            <a:r>
-              <a:rPr lang="en-US" dirty="0" smtClean="0"/>
-              <a:t>Goals?</a:t>
-            </a:r>
-          </a:p>
-          <a:p>
-            <a:endParaRPr lang="en-US" dirty="0" smtClean="0"/>
-          </a:p>
-          <a:p>
+            <a:pPr marL="457200" indent="-457200">
+              <a:buFont typeface="+mj-lt"/>
+              <a:buAutoNum type="arabicPeriod"/>
+            </a:pPr>
+            <a:r>
+              <a:rPr lang="en-US" dirty="0" smtClean="0"/>
+              <a:t>State the goals of the study and define the system boundaries</a:t>
+            </a:r>
+          </a:p>
+          <a:p>
+            <a:pPr marL="457200" indent="-457200">
+              <a:buFont typeface="+mj-lt"/>
+              <a:buAutoNum type="arabicPeriod"/>
+            </a:pPr>
+            <a:r>
+              <a:rPr lang="en-US" dirty="0" smtClean="0"/>
+              <a:t>List system services and possible outcomes</a:t>
+            </a:r>
+          </a:p>
+          <a:p>
+            <a:pPr marL="457200" indent="-457200">
+              <a:buFont typeface="+mj-lt"/>
+              <a:buAutoNum type="arabicPeriod"/>
+            </a:pPr>
+            <a:r>
+              <a:rPr lang="en-US" dirty="0" smtClean="0"/>
+              <a:t>Select performance metrics</a:t>
+            </a:r>
+          </a:p>
+          <a:p>
+            <a:pPr marL="457200" indent="-457200">
+              <a:buFont typeface="+mj-lt"/>
+              <a:buAutoNum type="arabicPeriod"/>
+            </a:pPr>
+            <a:r>
+              <a:rPr lang="en-US" dirty="0" smtClean="0"/>
+              <a:t>List system and workload parameters</a:t>
+            </a:r>
+          </a:p>
+          <a:p>
+            <a:pPr marL="457200" indent="-457200">
+              <a:buFont typeface="+mj-lt"/>
+              <a:buAutoNum type="arabicPeriod"/>
+            </a:pPr>
+            <a:r>
+              <a:rPr lang="en-US" dirty="0" smtClean="0"/>
+              <a:t>Select factors and their values</a:t>
+            </a:r>
+          </a:p>
+          <a:p>
+            <a:pPr marL="457200" indent="-457200">
+              <a:buFont typeface="+mj-lt"/>
+              <a:buAutoNum type="arabicPeriod"/>
+            </a:pPr>
+            <a:r>
+              <a:rPr lang="en-US" dirty="0" smtClean="0"/>
+              <a:t>Select evaluation techniques</a:t>
+            </a:r>
+          </a:p>
+          <a:p>
+            <a:pPr marL="457200" indent="-457200">
+              <a:buFont typeface="+mj-lt"/>
+              <a:buAutoNum type="arabicPeriod"/>
+            </a:pPr>
+            <a:r>
+              <a:rPr lang="en-US" dirty="0" smtClean="0"/>
+              <a:t>Select the workload</a:t>
+            </a:r>
+          </a:p>
+          <a:p>
+            <a:pPr marL="457200" indent="-457200">
+              <a:buFont typeface="+mj-lt"/>
+              <a:buAutoNum type="arabicPeriod"/>
+            </a:pPr>
+            <a:r>
+              <a:rPr lang="en-US" dirty="0" smtClean="0"/>
+              <a:t>Design the experiments</a:t>
+            </a:r>
+          </a:p>
+          <a:p>
+            <a:pPr marL="457200" indent="-457200">
+              <a:buFont typeface="+mj-lt"/>
+              <a:buAutoNum type="arabicPeriod"/>
+            </a:pPr>
+            <a:r>
+              <a:rPr lang="en-US" dirty="0" smtClean="0"/>
+              <a:t>Analyze and interpret the data</a:t>
+            </a:r>
+          </a:p>
+          <a:p>
+            <a:pPr marL="457200" indent="-457200">
+              <a:buFont typeface="+mj-lt"/>
+              <a:buAutoNum type="arabicPeriod"/>
+            </a:pPr>
+            <a:r>
+              <a:rPr lang="en-US" dirty="0" smtClean="0"/>
+              <a:t>Presents the results. Start over, if necessary</a:t>
+            </a:r>
             <a:endParaRPr lang="en-US" dirty="0"/>
           </a:p>
         </p:txBody>
@@ -5091,7 +5235,7 @@
     </p:spTree>
     <p:extLst>
       <p:ext uri="{BB962C8B-B14F-4D97-AF65-F5344CB8AC3E}">
-        <p14:creationId xmlns:p14="http://schemas.microsoft.com/office/powerpoint/2010/main" val="4219470010"/>
+        <p14:creationId xmlns:p14="http://schemas.microsoft.com/office/powerpoint/2010/main" val="2112818678"/>
       </p:ext>
     </p:extLst>
   </p:cSld>
@@ -5142,7 +5286,7 @@
           <a:p>
             <a:r>
               <a:rPr lang="en-US" dirty="0" smtClean="0"/>
-              <a:t>Step 2 – System services and outcomes</a:t>
+              <a:t>Step 1 – System boundary and goals</a:t>
             </a:r>
             <a:endParaRPr lang="en-US" dirty="0"/>
           </a:p>
@@ -5165,17 +5309,128 @@
           <a:p>
             <a:r>
               <a:rPr lang="en-US" dirty="0" smtClean="0"/>
+              <a:t>Application</a:t>
+            </a:r>
+          </a:p>
+          <a:p>
+            <a:r>
+              <a:rPr lang="en-US" dirty="0" smtClean="0"/>
+              <a:t>System software</a:t>
+            </a:r>
+          </a:p>
+          <a:p>
+            <a:r>
+              <a:rPr lang="en-US" dirty="0" smtClean="0"/>
+              <a:t>Real machine</a:t>
+            </a:r>
+          </a:p>
+          <a:p>
+            <a:r>
+              <a:rPr lang="en-US" dirty="0" smtClean="0"/>
+              <a:t>System or architecture ideas and trade-off</a:t>
+            </a:r>
+          </a:p>
+          <a:p>
+            <a:endParaRPr lang="en-US" dirty="0"/>
+          </a:p>
+          <a:p>
+            <a:r>
+              <a:rPr lang="en-US" dirty="0" smtClean="0"/>
+              <a:t>Goals?</a:t>
+            </a:r>
+          </a:p>
+          <a:p>
+            <a:endParaRPr lang="en-US" dirty="0" smtClean="0"/>
+          </a:p>
+          <a:p>
+            <a:endParaRPr lang="en-US" dirty="0"/>
+          </a:p>
+        </p:txBody>
+      </p:sp>
+    </p:spTree>
+    <p:extLst>
+      <p:ext uri="{BB962C8B-B14F-4D97-AF65-F5344CB8AC3E}">
+        <p14:creationId xmlns:p14="http://schemas.microsoft.com/office/powerpoint/2010/main" val="4219470010"/>
+      </p:ext>
+    </p:extLst>
+  </p:cSld>
+  <p:clrMapOvr>
+    <a:masterClrMapping/>
+  </p:clrMapOvr>
+  <p:timing>
+    <p:tnLst>
+      <p:par>
+        <p:cTn id="1" dur="indefinite" restart="never" nodeType="tmRoot"/>
+      </p:par>
+    </p:tnLst>
+  </p:timing>
+</p:sld>
+</file>
+
+<file path=ppt/slides/slide6.xml><?xml version="1.0" encoding="utf-8"?>
+<p:sld xmlns:a="http://schemas.openxmlformats.org/drawingml/2006/main" xmlns:r="http://schemas.openxmlformats.org/officeDocument/2006/relationships" xmlns:p="http://schemas.openxmlformats.org/presentationml/2006/main">
+  <p:cSld>
+    <p:spTree>
+      <p:nvGrpSpPr>
+        <p:cNvPr id="1" name=""/>
+        <p:cNvGrpSpPr/>
+        <p:nvPr/>
+      </p:nvGrpSpPr>
+      <p:grpSpPr>
+        <a:xfrm>
+          <a:off x="0" y="0"/>
+          <a:ext cx="0" cy="0"/>
+          <a:chOff x="0" y="0"/>
+          <a:chExt cx="0" cy="0"/>
+        </a:xfrm>
+      </p:grpSpPr>
+      <p:sp>
+        <p:nvSpPr>
+          <p:cNvPr id="2" name="Title 1"/>
+          <p:cNvSpPr>
+            <a:spLocks noGrp="1"/>
+          </p:cNvSpPr>
+          <p:nvPr>
+            <p:ph type="title"/>
+          </p:nvPr>
+        </p:nvSpPr>
+        <p:spPr/>
+        <p:txBody>
+          <a:bodyPr/>
+          <a:lstStyle/>
+          <a:p>
+            <a:r>
+              <a:rPr lang="en-US" dirty="0" smtClean="0"/>
+              <a:t>Step 2 – System services and outcomes</a:t>
+            </a:r>
+            <a:endParaRPr lang="en-US" dirty="0"/>
+          </a:p>
+        </p:txBody>
+      </p:sp>
+      <p:sp>
+        <p:nvSpPr>
+          <p:cNvPr id="3" name="Content Placeholder 2"/>
+          <p:cNvSpPr>
+            <a:spLocks noGrp="1"/>
+          </p:cNvSpPr>
+          <p:nvPr>
+            <p:ph idx="1"/>
+          </p:nvPr>
+        </p:nvSpPr>
+        <p:spPr/>
+        <p:txBody>
+          <a:bodyPr/>
+          <a:lstStyle/>
+          <a:p>
+            <a:r>
+              <a:rPr lang="en-US" dirty="0" smtClean="0"/>
               <a:t>System or application specific</a:t>
             </a:r>
           </a:p>
           <a:p>
             <a:r>
               <a:rPr lang="en-US" dirty="0" smtClean="0"/>
-              <a:t>Deduplication services</a:t>
-            </a:r>
-            <a:r>
-              <a:rPr lang="en-US" dirty="0" smtClean="0"/>
-              <a:t>?</a:t>
+              <a:t>Deduplication services?</a:t>
             </a:r>
           </a:p>
           <a:p>
@@ -5183,7 +5438,6 @@
               <a:rPr lang="en-US" dirty="0" smtClean="0"/>
               <a:t>Deduplication outcomes?</a:t>
             </a:r>
-            <a:endParaRPr lang="en-US" dirty="0" smtClean="0"/>
           </a:p>
         </p:txBody>
       </p:sp>
@@ -5200,7 +5454,7 @@
 </p:sld>
 </file>
 
-<file path=ppt/slides/slide6.xml><?xml version="1.0" encoding="utf-8"?>
+<file path=ppt/slides/slide7.xml><?xml version="1.0" encoding="utf-8"?>
 <p:sld xmlns:a="http://schemas.openxmlformats.org/drawingml/2006/main" xmlns:r="http://schemas.openxmlformats.org/officeDocument/2006/relationships" xmlns:p="http://schemas.openxmlformats.org/presentationml/2006/main">
   <p:cSld>
     <p:spTree>
@@ -6091,7 +6345,7 @@
 </p:sld>
 </file>
 
-<file path=ppt/slides/slide7.xml><?xml version="1.0" encoding="utf-8"?>
+<file path=ppt/slides/slide8.xml><?xml version="1.0" encoding="utf-8"?>
 <p:sld xmlns:a="http://schemas.openxmlformats.org/drawingml/2006/main" xmlns:r="http://schemas.openxmlformats.org/officeDocument/2006/relationships" xmlns:p="http://schemas.openxmlformats.org/presentationml/2006/main">
   <p:cSld>
     <p:spTree>
@@ -6203,135 +6457,6 @@
 </p:sld>
 </file>
 
-<file path=ppt/slides/slide8.xml><?xml version="1.0" encoding="utf-8"?>
-<p:sld xmlns:a="http://schemas.openxmlformats.org/drawingml/2006/main" xmlns:r="http://schemas.openxmlformats.org/officeDocument/2006/relationships" xmlns:p="http://schemas.openxmlformats.org/presentationml/2006/main">
-  <p:cSld>
-    <p:spTree>
-      <p:nvGrpSpPr>
-        <p:cNvPr id="1" name=""/>
-        <p:cNvGrpSpPr/>
-        <p:nvPr/>
-      </p:nvGrpSpPr>
-      <p:grpSpPr>
-        <a:xfrm>
-          <a:off x="0" y="0"/>
-          <a:ext cx="0" cy="0"/>
-          <a:chOff x="0" y="0"/>
-          <a:chExt cx="0" cy="0"/>
-        </a:xfrm>
-      </p:grpSpPr>
-      <p:sp>
-        <p:nvSpPr>
-          <p:cNvPr id="2" name="Title 1"/>
-          <p:cNvSpPr>
-            <a:spLocks noGrp="1"/>
-          </p:cNvSpPr>
-          <p:nvPr>
-            <p:ph type="title"/>
-          </p:nvPr>
-        </p:nvSpPr>
-        <p:spPr/>
-        <p:txBody>
-          <a:bodyPr/>
-          <a:lstStyle/>
-          <a:p>
-            <a:r>
-              <a:rPr lang="en-US" dirty="0" smtClean="0"/>
-              <a:t>Speedup</a:t>
-            </a:r>
-            <a:endParaRPr lang="en-US" dirty="0"/>
-          </a:p>
-        </p:txBody>
-      </p:sp>
-      <p:sp>
-        <p:nvSpPr>
-          <p:cNvPr id="3" name="Content Placeholder 2"/>
-          <p:cNvSpPr>
-            <a:spLocks noGrp="1"/>
-          </p:cNvSpPr>
-          <p:nvPr>
-            <p:ph idx="1"/>
-          </p:nvPr>
-        </p:nvSpPr>
-        <p:spPr/>
-        <p:txBody>
-          <a:bodyPr/>
-          <a:lstStyle/>
-          <a:p>
-            <a:r>
-              <a:rPr lang="en-US" dirty="0" smtClean="0"/>
-              <a:t>Speedup = time(1) / time(N)</a:t>
-            </a:r>
-          </a:p>
-          <a:p>
-            <a:r>
-              <a:rPr lang="en-US" dirty="0" smtClean="0"/>
-              <a:t>How to measure time(1)?</a:t>
-            </a:r>
-          </a:p>
-          <a:p>
-            <a:pPr marL="914400" lvl="1" indent="-457200">
-              <a:buFont typeface="+mj-lt"/>
-              <a:buAutoNum type="arabicPeriod"/>
-            </a:pPr>
-            <a:r>
-              <a:rPr lang="en-US" dirty="0" smtClean="0"/>
-              <a:t>Parallel program on one core on parallel machine</a:t>
-            </a:r>
-          </a:p>
-          <a:p>
-            <a:pPr marL="914400" lvl="1" indent="-457200">
-              <a:buFont typeface="+mj-lt"/>
-              <a:buAutoNum type="arabicPeriod"/>
-            </a:pPr>
-            <a:r>
-              <a:rPr lang="en-US" dirty="0" smtClean="0"/>
-              <a:t>Sequential program on one core </a:t>
-            </a:r>
-            <a:r>
-              <a:rPr lang="en-US" dirty="0"/>
-              <a:t>on parallel </a:t>
-            </a:r>
-            <a:r>
-              <a:rPr lang="en-US" dirty="0" smtClean="0"/>
-              <a:t>machine</a:t>
-            </a:r>
-          </a:p>
-          <a:p>
-            <a:pPr marL="914400" lvl="1" indent="-457200">
-              <a:buFont typeface="+mj-lt"/>
-              <a:buAutoNum type="arabicPeriod"/>
-            </a:pPr>
-            <a:r>
-              <a:rPr lang="en-US" dirty="0" smtClean="0"/>
-              <a:t>Best sequential program on one core on parallel machine</a:t>
-            </a:r>
-          </a:p>
-          <a:p>
-            <a:pPr marL="914400" lvl="1" indent="-457200">
-              <a:buFont typeface="+mj-lt"/>
-              <a:buAutoNum type="arabicPeriod"/>
-            </a:pPr>
-            <a:r>
-              <a:rPr lang="en-US" dirty="0" smtClean="0"/>
-              <a:t>Best sequential program on standard machine</a:t>
-            </a:r>
-          </a:p>
-        </p:txBody>
-      </p:sp>
-    </p:spTree>
-    <p:extLst>
-      <p:ext uri="{BB962C8B-B14F-4D97-AF65-F5344CB8AC3E}">
-        <p14:creationId xmlns:p14="http://schemas.microsoft.com/office/powerpoint/2010/main" val="1166391480"/>
-      </p:ext>
-    </p:extLst>
-  </p:cSld>
-  <p:clrMapOvr>
-    <a:masterClrMapping/>
-  </p:clrMapOvr>
-</p:sld>
-</file>
-
 <file path=ppt/slides/slide9.xml><?xml version="1.0" encoding="utf-8"?>
 <p:sld xmlns:a="http://schemas.openxmlformats.org/drawingml/2006/main" xmlns:r="http://schemas.openxmlformats.org/officeDocument/2006/relationships" xmlns:p="http://schemas.openxmlformats.org/presentationml/2006/main">
   <p:cSld>
@@ -6366,7 +6491,7 @@
           <a:p>
             <a:r>
               <a:rPr lang="en-US" dirty="0" smtClean="0"/>
-              <a:t>Scalability</a:t>
+              <a:t>Speedup</a:t>
             </a:r>
             <a:endParaRPr lang="en-US" dirty="0"/>
           </a:p>
@@ -6384,143 +6509,80 @@
         </p:nvSpPr>
         <p:spPr/>
         <p:txBody>
-          <a:bodyPr>
-            <a:normAutofit fontScale="85000" lnSpcReduction="10000"/>
-          </a:bodyPr>
+          <a:bodyPr/>
           <a:lstStyle/>
           <a:p>
             <a:r>
               <a:rPr lang="en-US" dirty="0" smtClean="0"/>
-              <a:t>User-oriented properties:</a:t>
-            </a:r>
-          </a:p>
-          <a:p>
-            <a:pPr lvl="1"/>
-            <a:r>
-              <a:rPr lang="en-US" dirty="0" smtClean="0"/>
-              <a:t>Domain specific</a:t>
-            </a:r>
-          </a:p>
-          <a:p>
-            <a:pPr lvl="2"/>
-            <a:r>
-              <a:rPr lang="en-US" dirty="0" smtClean="0"/>
-              <a:t>Example: number of rows in table</a:t>
-            </a:r>
-            <a:endParaRPr lang="en-US" dirty="0"/>
-          </a:p>
-          <a:p>
-            <a:r>
-              <a:rPr lang="en-US" dirty="0" smtClean="0"/>
-              <a:t>Resource-oriented properties</a:t>
-            </a:r>
-          </a:p>
-          <a:p>
-            <a:pPr lvl="1"/>
-            <a:r>
-              <a:rPr lang="en-US" dirty="0" smtClean="0"/>
-              <a:t>Problem-constrained scaling</a:t>
-            </a:r>
-          </a:p>
-          <a:p>
-            <a:pPr lvl="2"/>
-            <a:r>
-              <a:rPr lang="en-US" dirty="0" smtClean="0"/>
-              <a:t>Problem size is fixed</a:t>
-            </a:r>
-          </a:p>
-          <a:p>
-            <a:pPr lvl="2"/>
-            <a:r>
-              <a:rPr lang="en-US" dirty="0" smtClean="0"/>
-              <a:t>Speedup = Time(1) / Time(N)</a:t>
-            </a:r>
-          </a:p>
-          <a:p>
-            <a:pPr lvl="1"/>
-            <a:r>
-              <a:rPr lang="en-US" dirty="0" smtClean="0"/>
-              <a:t>Time-constrained scaling</a:t>
-            </a:r>
-          </a:p>
-          <a:p>
-            <a:pPr lvl="2"/>
-            <a:r>
-              <a:rPr lang="en-US" dirty="0" smtClean="0"/>
-              <a:t>Wall-clock time is fixed</a:t>
-            </a:r>
-          </a:p>
-          <a:p>
-            <a:pPr lvl="2"/>
-            <a:r>
-              <a:rPr lang="en-US" dirty="0" smtClean="0"/>
-              <a:t>Speedup = Work(N) / Work(1)</a:t>
-            </a:r>
-          </a:p>
-          <a:p>
-            <a:pPr lvl="2"/>
-            <a:r>
-              <a:rPr lang="en-US" dirty="0" smtClean="0"/>
-              <a:t>How to measure work?</a:t>
-            </a:r>
-          </a:p>
-          <a:p>
-            <a:pPr lvl="1"/>
-            <a:r>
-              <a:rPr lang="en-US" dirty="0" smtClean="0"/>
-              <a:t>Memory-constrained scaling</a:t>
-            </a:r>
-          </a:p>
-          <a:p>
-            <a:pPr lvl="2"/>
-            <a:r>
-              <a:rPr lang="en-US" dirty="0" smtClean="0"/>
-              <a:t>Memory usage per thread is fixed</a:t>
-            </a:r>
-          </a:p>
-          <a:p>
-            <a:pPr lvl="2"/>
-            <a:r>
-              <a:rPr lang="en-US" dirty="0" smtClean="0"/>
-              <a:t>Speedup = (Work(N) / Time(N)) x (Time(1) / Work(1))</a:t>
-            </a:r>
-            <a:br>
-              <a:rPr lang="en-US" dirty="0" smtClean="0"/>
-            </a:br>
-            <a:r>
-              <a:rPr lang="en-US" dirty="0" smtClean="0"/>
-              <a:t>                = Increase in work / increase in wall-clock time</a:t>
-            </a:r>
-          </a:p>
-          <a:p>
-            <a:pPr lvl="1"/>
-            <a:r>
-              <a:rPr lang="en-US" dirty="0" smtClean="0"/>
-              <a:t>“Others”</a:t>
-            </a:r>
-          </a:p>
-          <a:p>
-            <a:endParaRPr lang="en-US" dirty="0"/>
+              <a:t>Speedup = time(1) / time(N)</a:t>
+            </a:r>
+          </a:p>
+          <a:p>
+            <a:r>
+              <a:rPr lang="en-US" dirty="0" smtClean="0"/>
+              <a:t>How to measure time(1)?</a:t>
+            </a:r>
+          </a:p>
+          <a:p>
+            <a:pPr marL="914400" lvl="1" indent="-457200">
+              <a:buFont typeface="+mj-lt"/>
+              <a:buAutoNum type="arabicPeriod"/>
+            </a:pPr>
+            <a:r>
+              <a:rPr lang="en-US" dirty="0" smtClean="0"/>
+              <a:t>Parallel program on one core on parallel machine</a:t>
+            </a:r>
+          </a:p>
+          <a:p>
+            <a:pPr marL="914400" lvl="1" indent="-457200">
+              <a:buFont typeface="+mj-lt"/>
+              <a:buAutoNum type="arabicPeriod"/>
+            </a:pPr>
+            <a:r>
+              <a:rPr lang="en-US" dirty="0" smtClean="0"/>
+              <a:t>Sequential program on one core </a:t>
+            </a:r>
+            <a:r>
+              <a:rPr lang="en-US" dirty="0"/>
+              <a:t>on parallel </a:t>
+            </a:r>
+            <a:r>
+              <a:rPr lang="en-US" dirty="0" smtClean="0"/>
+              <a:t>machine</a:t>
+            </a:r>
+          </a:p>
+          <a:p>
+            <a:pPr marL="914400" lvl="1" indent="-457200">
+              <a:buFont typeface="+mj-lt"/>
+              <a:buAutoNum type="arabicPeriod"/>
+            </a:pPr>
+            <a:r>
+              <a:rPr lang="en-US" dirty="0" smtClean="0"/>
+              <a:t>Best sequential program on one core on parallel machine</a:t>
+            </a:r>
+          </a:p>
+          <a:p>
+            <a:pPr marL="914400" lvl="1" indent="-457200">
+              <a:buFont typeface="+mj-lt"/>
+              <a:buAutoNum type="arabicPeriod"/>
+            </a:pPr>
+            <a:r>
+              <a:rPr lang="en-US" dirty="0" smtClean="0"/>
+              <a:t>Best sequential program on standard machine</a:t>
+            </a:r>
           </a:p>
         </p:txBody>
       </p:sp>
     </p:spTree>
     <p:extLst>
       <p:ext uri="{BB962C8B-B14F-4D97-AF65-F5344CB8AC3E}">
-        <p14:creationId xmlns:p14="http://schemas.microsoft.com/office/powerpoint/2010/main" val="1005066756"/>
+        <p14:creationId xmlns:p14="http://schemas.microsoft.com/office/powerpoint/2010/main" val="1166391480"/>
       </p:ext>
     </p:extLst>
   </p:cSld>
   <p:clrMapOvr>
     <a:masterClrMapping/>
   </p:clrMapOvr>
-  <p:timing>
-    <p:tnLst>
-      <p:par>
-        <p:cTn id="1" dur="indefinite" restart="never" nodeType="tmRoot"/>
-      </p:par>
-    </p:tnLst>
-  </p:timing>
 </p:sld>
 </file>
 

</xml_diff>